<commit_message>
Added slide on pptx
</commit_message>
<xml_diff>
--- a/Bachelorarbeit Vortrag #1.pptx
+++ b/Bachelorarbeit Vortrag #1.pptx
@@ -5,7 +5,7 @@
     <p:sldMasterId id="2147483648" r:id="rId1"/>
   </p:sldMasterIdLst>
   <p:notesMasterIdLst>
-    <p:notesMasterId r:id="rId12"/>
+    <p:notesMasterId r:id="rId13"/>
   </p:notesMasterIdLst>
   <p:sldIdLst>
     <p:sldId id="256" r:id="rId2"/>
@@ -16,8 +16,9 @@
     <p:sldId id="258" r:id="rId7"/>
     <p:sldId id="259" r:id="rId8"/>
     <p:sldId id="260" r:id="rId9"/>
-    <p:sldId id="261" r:id="rId10"/>
-    <p:sldId id="262" r:id="rId11"/>
+    <p:sldId id="266" r:id="rId10"/>
+    <p:sldId id="261" r:id="rId11"/>
+    <p:sldId id="262" r:id="rId12"/>
   </p:sldIdLst>
   <p:sldSz cx="12192000" cy="6858000"/>
   <p:notesSz cx="6858000" cy="9144000"/>
@@ -116,6 +117,11 @@
       </a:defRPr>
     </a:lvl9pPr>
   </p:defaultTextStyle>
+  <p:extLst>
+    <p:ext uri="{EFAFB233-063F-42B5-8137-9DF3F51BA10A}">
+      <p15:sldGuideLst xmlns:p15="http://schemas.microsoft.com/office/powerpoint/2012/main"/>
+    </p:ext>
+  </p:extLst>
 </p:presentation>
 </file>
 
@@ -201,7 +207,7 @@
           <a:p>
             <a:fld id="{203B6EAA-BA0C-4A83-88DF-C6A8D135BE8D}" type="datetimeFigureOut">
               <a:rPr lang="de-DE" smtClean="0"/>
-              <a:t>01.06.2016</a:t>
+              <a:t>08.06.2016</a:t>
             </a:fld>
             <a:endParaRPr lang="de-DE"/>
           </a:p>
@@ -718,7 +724,7 @@
           <a:p>
             <a:fld id="{7323AE44-9A21-4040-AEAE-BA4988ED83FF}" type="datetimeFigureOut">
               <a:rPr lang="de-DE" smtClean="0"/>
-              <a:t>01.06.2016</a:t>
+              <a:t>08.06.2016</a:t>
             </a:fld>
             <a:endParaRPr lang="de-DE"/>
           </a:p>
@@ -888,7 +894,7 @@
           <a:p>
             <a:fld id="{7323AE44-9A21-4040-AEAE-BA4988ED83FF}" type="datetimeFigureOut">
               <a:rPr lang="de-DE" smtClean="0"/>
-              <a:t>01.06.2016</a:t>
+              <a:t>08.06.2016</a:t>
             </a:fld>
             <a:endParaRPr lang="de-DE"/>
           </a:p>
@@ -1068,7 +1074,7 @@
           <a:p>
             <a:fld id="{7323AE44-9A21-4040-AEAE-BA4988ED83FF}" type="datetimeFigureOut">
               <a:rPr lang="de-DE" smtClean="0"/>
-              <a:t>01.06.2016</a:t>
+              <a:t>08.06.2016</a:t>
             </a:fld>
             <a:endParaRPr lang="de-DE"/>
           </a:p>
@@ -1238,7 +1244,7 @@
           <a:p>
             <a:fld id="{7323AE44-9A21-4040-AEAE-BA4988ED83FF}" type="datetimeFigureOut">
               <a:rPr lang="de-DE" smtClean="0"/>
-              <a:t>01.06.2016</a:t>
+              <a:t>08.06.2016</a:t>
             </a:fld>
             <a:endParaRPr lang="de-DE"/>
           </a:p>
@@ -1484,7 +1490,7 @@
           <a:p>
             <a:fld id="{7323AE44-9A21-4040-AEAE-BA4988ED83FF}" type="datetimeFigureOut">
               <a:rPr lang="de-DE" smtClean="0"/>
-              <a:t>01.06.2016</a:t>
+              <a:t>08.06.2016</a:t>
             </a:fld>
             <a:endParaRPr lang="de-DE"/>
           </a:p>
@@ -1716,7 +1722,7 @@
           <a:p>
             <a:fld id="{7323AE44-9A21-4040-AEAE-BA4988ED83FF}" type="datetimeFigureOut">
               <a:rPr lang="de-DE" smtClean="0"/>
-              <a:t>01.06.2016</a:t>
+              <a:t>08.06.2016</a:t>
             </a:fld>
             <a:endParaRPr lang="de-DE"/>
           </a:p>
@@ -2083,7 +2089,7 @@
           <a:p>
             <a:fld id="{7323AE44-9A21-4040-AEAE-BA4988ED83FF}" type="datetimeFigureOut">
               <a:rPr lang="de-DE" smtClean="0"/>
-              <a:t>01.06.2016</a:t>
+              <a:t>08.06.2016</a:t>
             </a:fld>
             <a:endParaRPr lang="de-DE"/>
           </a:p>
@@ -2201,7 +2207,7 @@
           <a:p>
             <a:fld id="{7323AE44-9A21-4040-AEAE-BA4988ED83FF}" type="datetimeFigureOut">
               <a:rPr lang="de-DE" smtClean="0"/>
-              <a:t>01.06.2016</a:t>
+              <a:t>08.06.2016</a:t>
             </a:fld>
             <a:endParaRPr lang="de-DE"/>
           </a:p>
@@ -2296,7 +2302,7 @@
           <a:p>
             <a:fld id="{7323AE44-9A21-4040-AEAE-BA4988ED83FF}" type="datetimeFigureOut">
               <a:rPr lang="de-DE" smtClean="0"/>
-              <a:t>01.06.2016</a:t>
+              <a:t>08.06.2016</a:t>
             </a:fld>
             <a:endParaRPr lang="de-DE"/>
           </a:p>
@@ -2573,7 +2579,7 @@
           <a:p>
             <a:fld id="{7323AE44-9A21-4040-AEAE-BA4988ED83FF}" type="datetimeFigureOut">
               <a:rPr lang="de-DE" smtClean="0"/>
-              <a:t>01.06.2016</a:t>
+              <a:t>08.06.2016</a:t>
             </a:fld>
             <a:endParaRPr lang="de-DE"/>
           </a:p>
@@ -2826,7 +2832,7 @@
           <a:p>
             <a:fld id="{7323AE44-9A21-4040-AEAE-BA4988ED83FF}" type="datetimeFigureOut">
               <a:rPr lang="de-DE" smtClean="0"/>
-              <a:t>01.06.2016</a:t>
+              <a:t>08.06.2016</a:t>
             </a:fld>
             <a:endParaRPr lang="de-DE"/>
           </a:p>
@@ -3039,7 +3045,7 @@
           <a:p>
             <a:fld id="{7323AE44-9A21-4040-AEAE-BA4988ED83FF}" type="datetimeFigureOut">
               <a:rPr lang="de-DE" smtClean="0"/>
-              <a:t>01.06.2016</a:t>
+              <a:t>08.06.2016</a:t>
             </a:fld>
             <a:endParaRPr lang="de-DE"/>
           </a:p>
@@ -3539,6 +3545,153 @@
         </p:nvSpPr>
         <p:spPr>
           <a:xfrm>
+            <a:off x="838200" y="365125"/>
+            <a:ext cx="10728960" cy="1325563"/>
+          </a:xfrm>
+        </p:spPr>
+        <p:txBody>
+          <a:bodyPr/>
+          <a:lstStyle/>
+          <a:p>
+            <a:r>
+              <a:rPr lang="de-DE" dirty="0" smtClean="0"/>
+              <a:t>Andere </a:t>
+            </a:r>
+            <a:r>
+              <a:rPr lang="de-DE" dirty="0" err="1" smtClean="0"/>
+              <a:t>Extensions</a:t>
+            </a:r>
+            <a:r>
+              <a:rPr lang="de-DE" dirty="0"/>
+              <a:t> </a:t>
+            </a:r>
+            <a:r>
+              <a:rPr lang="de-DE" dirty="0" smtClean="0"/>
+              <a:t>(Kommunikationsplattform)</a:t>
+            </a:r>
+            <a:endParaRPr lang="de-DE" dirty="0"/>
+          </a:p>
+        </p:txBody>
+      </p:sp>
+      <p:sp>
+        <p:nvSpPr>
+          <p:cNvPr id="3" name="Inhaltsplatzhalter 2"/>
+          <p:cNvSpPr>
+            <a:spLocks noGrp="1"/>
+          </p:cNvSpPr>
+          <p:nvPr>
+            <p:ph idx="1"/>
+          </p:nvPr>
+        </p:nvSpPr>
+        <p:spPr>
+          <a:xfrm>
+            <a:off x="838200" y="1825624"/>
+            <a:ext cx="10515600" cy="4872355"/>
+          </a:xfrm>
+        </p:spPr>
+        <p:txBody>
+          <a:bodyPr/>
+          <a:lstStyle/>
+          <a:p>
+            <a:r>
+              <a:rPr lang="de-DE" dirty="0" smtClean="0"/>
+              <a:t>News</a:t>
+            </a:r>
+          </a:p>
+          <a:p>
+            <a:r>
+              <a:rPr lang="de-DE" dirty="0" smtClean="0"/>
+              <a:t>Blog</a:t>
+            </a:r>
+          </a:p>
+          <a:p>
+            <a:r>
+              <a:rPr lang="de-DE" dirty="0" smtClean="0"/>
+              <a:t>Registrierung und Login</a:t>
+            </a:r>
+          </a:p>
+          <a:p>
+            <a:r>
+              <a:rPr lang="de-DE" dirty="0" smtClean="0"/>
+              <a:t>Unterstützung von Autoren</a:t>
+            </a:r>
+          </a:p>
+          <a:p>
+            <a:r>
+              <a:rPr lang="de-DE" dirty="0" smtClean="0"/>
+              <a:t>Mail</a:t>
+            </a:r>
+          </a:p>
+          <a:p>
+            <a:r>
+              <a:rPr lang="de-DE" dirty="0" smtClean="0"/>
+              <a:t>Wissenschaftliche Arbeiten teilen</a:t>
+            </a:r>
+          </a:p>
+          <a:p>
+            <a:r>
+              <a:rPr lang="de-DE" dirty="0" smtClean="0"/>
+              <a:t>Kalender</a:t>
+            </a:r>
+          </a:p>
+          <a:p>
+            <a:r>
+              <a:rPr lang="de-DE" dirty="0" smtClean="0"/>
+              <a:t>Wartung/SEO</a:t>
+            </a:r>
+            <a:endParaRPr lang="de-DE" dirty="0"/>
+          </a:p>
+        </p:txBody>
+      </p:sp>
+    </p:spTree>
+    <p:extLst>
+      <p:ext uri="{BB962C8B-B14F-4D97-AF65-F5344CB8AC3E}">
+        <p14:creationId xmlns:p14="http://schemas.microsoft.com/office/powerpoint/2010/main" val="4062709998"/>
+      </p:ext>
+    </p:extLst>
+  </p:cSld>
+  <p:clrMapOvr>
+    <a:masterClrMapping/>
+  </p:clrMapOvr>
+  <p:timing>
+    <p:tnLst>
+      <p:par>
+        <p:cTn id="1" dur="indefinite" restart="never" nodeType="tmRoot"/>
+      </p:par>
+    </p:tnLst>
+  </p:timing>
+</p:sld>
+</file>
+
+<file path=ppt/slides/slide11.xml><?xml version="1.0" encoding="utf-8"?>
+<p:sld xmlns:a="http://schemas.openxmlformats.org/drawingml/2006/main" xmlns:r="http://schemas.openxmlformats.org/officeDocument/2006/relationships" xmlns:p="http://schemas.openxmlformats.org/presentationml/2006/main">
+  <p:cSld>
+    <p:spTree>
+      <p:nvGrpSpPr>
+        <p:cNvPr id="1" name=""/>
+        <p:cNvGrpSpPr/>
+        <p:nvPr/>
+      </p:nvGrpSpPr>
+      <p:grpSpPr>
+        <a:xfrm>
+          <a:off x="0" y="0"/>
+          <a:ext cx="0" cy="0"/>
+          <a:chOff x="0" y="0"/>
+          <a:chExt cx="0" cy="0"/>
+        </a:xfrm>
+      </p:grpSpPr>
+      <p:sp>
+        <p:nvSpPr>
+          <p:cNvPr id="2" name="Titel 1"/>
+          <p:cNvSpPr>
+            <a:spLocks noGrp="1"/>
+          </p:cNvSpPr>
+          <p:nvPr>
+            <p:ph type="title"/>
+          </p:nvPr>
+        </p:nvSpPr>
+        <p:spPr>
+          <a:xfrm>
             <a:off x="790073" y="2007017"/>
             <a:ext cx="10515600" cy="1325563"/>
           </a:xfrm>
@@ -4377,8 +4530,8 @@
         </p:nvSpPr>
         <p:spPr>
           <a:xfrm>
-            <a:off x="838200" y="365125"/>
-            <a:ext cx="10728960" cy="1325563"/>
+            <a:off x="1611794" y="365125"/>
+            <a:ext cx="9742005" cy="1325563"/>
           </a:xfrm>
         </p:spPr>
         <p:txBody>
@@ -4387,98 +4540,46 @@
           <a:p>
             <a:r>
               <a:rPr lang="de-DE" dirty="0" smtClean="0"/>
-              <a:t>Andere </a:t>
-            </a:r>
-            <a:r>
-              <a:rPr lang="de-DE" dirty="0" err="1" smtClean="0"/>
-              <a:t>Extensions</a:t>
-            </a:r>
-            <a:r>
-              <a:rPr lang="de-DE" dirty="0"/>
-              <a:t> </a:t>
-            </a:r>
-            <a:r>
-              <a:rPr lang="de-DE" dirty="0" smtClean="0"/>
-              <a:t>(Kommunikationsplattform)</a:t>
-            </a:r>
-            <a:endParaRPr lang="de-DE" dirty="0"/>
-          </a:p>
-        </p:txBody>
-      </p:sp>
-      <p:sp>
-        <p:nvSpPr>
-          <p:cNvPr id="3" name="Inhaltsplatzhalter 2"/>
-          <p:cNvSpPr>
-            <a:spLocks noGrp="1"/>
-          </p:cNvSpPr>
-          <p:nvPr>
-            <p:ph idx="1"/>
-          </p:nvPr>
-        </p:nvSpPr>
+              <a:t>Testumgebung</a:t>
+            </a:r>
+            <a:endParaRPr lang="de-DE" i="1" dirty="0"/>
+          </a:p>
+        </p:txBody>
+      </p:sp>
+      <p:pic>
+        <p:nvPicPr>
+          <p:cNvPr id="3" name="Grafik 2"/>
+          <p:cNvPicPr>
+            <a:picLocks noChangeAspect="1"/>
+          </p:cNvPicPr>
+          <p:nvPr/>
+        </p:nvPicPr>
+        <p:blipFill>
+          <a:blip r:embed="rId2">
+            <a:extLst>
+              <a:ext uri="{28A0092B-C50C-407E-A947-70E740481C1C}">
+                <a14:useLocalDpi xmlns:a14="http://schemas.microsoft.com/office/drawing/2010/main" val="0"/>
+              </a:ext>
+            </a:extLst>
+          </a:blip>
+          <a:stretch>
+            <a:fillRect/>
+          </a:stretch>
+        </p:blipFill>
         <p:spPr>
           <a:xfrm>
-            <a:off x="838200" y="1825624"/>
-            <a:ext cx="10515600" cy="4872355"/>
+            <a:off x="1611794" y="1440559"/>
+            <a:ext cx="9605209" cy="5417441"/>
           </a:xfrm>
+          <a:prstGeom prst="rect">
+            <a:avLst/>
+          </a:prstGeom>
         </p:spPr>
-        <p:txBody>
-          <a:bodyPr/>
-          <a:lstStyle/>
-          <a:p>
-            <a:r>
-              <a:rPr lang="de-DE" dirty="0" smtClean="0"/>
-              <a:t>News</a:t>
-            </a:r>
-          </a:p>
-          <a:p>
-            <a:r>
-              <a:rPr lang="de-DE" dirty="0" smtClean="0"/>
-              <a:t>Blog</a:t>
-            </a:r>
-          </a:p>
-          <a:p>
-            <a:r>
-              <a:rPr lang="de-DE" dirty="0" smtClean="0"/>
-              <a:t>Registrierung und Login</a:t>
-            </a:r>
-          </a:p>
-          <a:p>
-            <a:r>
-              <a:rPr lang="de-DE" dirty="0" smtClean="0"/>
-              <a:t>Unterstützung von Autoren</a:t>
-            </a:r>
-          </a:p>
-          <a:p>
-            <a:r>
-              <a:rPr lang="de-DE" dirty="0" smtClean="0"/>
-              <a:t>Mail</a:t>
-            </a:r>
-          </a:p>
-          <a:p>
-            <a:r>
-              <a:rPr lang="de-DE" dirty="0" smtClean="0"/>
-              <a:t>Wissenschaftliche Arbeiten teilen</a:t>
-            </a:r>
-          </a:p>
-          <a:p>
-            <a:r>
-              <a:rPr lang="de-DE" dirty="0" smtClean="0"/>
-              <a:t>Kalender</a:t>
-            </a:r>
-          </a:p>
-          <a:p>
-            <a:r>
-              <a:rPr lang="de-DE" dirty="0" smtClean="0"/>
-              <a:t>Wartung/SEO</a:t>
-            </a:r>
-            <a:endParaRPr lang="de-DE" dirty="0"/>
-          </a:p>
-        </p:txBody>
-      </p:sp>
+      </p:pic>
     </p:spTree>
     <p:extLst>
       <p:ext uri="{BB962C8B-B14F-4D97-AF65-F5344CB8AC3E}">
-        <p14:creationId xmlns:p14="http://schemas.microsoft.com/office/powerpoint/2010/main" val="4062709998"/>
+        <p14:creationId xmlns:p14="http://schemas.microsoft.com/office/powerpoint/2010/main" val="454024122"/>
       </p:ext>
     </p:extLst>
   </p:cSld>

</xml_diff>